<commit_message>
slido question for case study slides
</commit_message>
<xml_diff>
--- a/Lectures/03-casestudies.pptx
+++ b/Lectures/03-casestudies.pptx
@@ -5,7 +5,7 @@
     <p:sldMasterId id="2147483648" r:id="rId1"/>
   </p:sldMasterIdLst>
   <p:notesMasterIdLst>
-    <p:notesMasterId r:id="rId18"/>
+    <p:notesMasterId r:id="rId19"/>
   </p:notesMasterIdLst>
   <p:sldIdLst>
     <p:sldId id="256" r:id="rId2"/>
@@ -19,11 +19,12 @@
     <p:sldId id="296" r:id="rId10"/>
     <p:sldId id="299" r:id="rId11"/>
     <p:sldId id="300" r:id="rId12"/>
-    <p:sldId id="301" r:id="rId13"/>
-    <p:sldId id="302" r:id="rId14"/>
-    <p:sldId id="303" r:id="rId15"/>
-    <p:sldId id="304" r:id="rId16"/>
-    <p:sldId id="298" r:id="rId17"/>
+    <p:sldId id="305" r:id="rId13"/>
+    <p:sldId id="301" r:id="rId14"/>
+    <p:sldId id="302" r:id="rId15"/>
+    <p:sldId id="303" r:id="rId16"/>
+    <p:sldId id="304" r:id="rId17"/>
+    <p:sldId id="298" r:id="rId18"/>
   </p:sldIdLst>
   <p:sldSz cx="12192000" cy="6858000"/>
   <p:notesSz cx="6858000" cy="9144000"/>
@@ -261,7 +262,7 @@
       <p15:sldGuideLst xmlns:p15="http://schemas.microsoft.com/office/powerpoint/2012/main"/>
     </p:ext>
     <p:ext uri="http://customooxmlschemas.google.com/">
-      <go:slidesCustomData xmlns="" xmlns:mc="http://schemas.openxmlformats.org/markup-compatibility/2006" xmlns:mv="urn:schemas-microsoft-com:mac:vml" xmlns:c="http://schemas.openxmlformats.org/drawingml/2006/chart" xmlns:dgm="http://schemas.openxmlformats.org/drawingml/2006/diagram" xmlns:o="urn:schemas-microsoft-com:office:office" xmlns:v="urn:schemas-microsoft-com:vml" xmlns:pvml="urn:schemas-microsoft-com:office:powerpoint" xmlns:com="http://schemas.openxmlformats.org/drawingml/2006/compatibility" xmlns:p14="http://schemas.microsoft.com/office/powerpoint/2010/main" xmlns:p15="http://schemas.microsoft.com/office/powerpoint/2012/main" xmlns:go="http://customooxmlschemas.google.com/" r:id="rId30" roundtripDataSignature="AMtx7mjFyVUGRZWio+dc9dxzYsimUxNJbg=="/>
+      <go:slidesCustomData xmlns:go="http://customooxmlschemas.google.com/" xmlns:p15="http://schemas.microsoft.com/office/powerpoint/2012/main" xmlns:p14="http://schemas.microsoft.com/office/powerpoint/2010/main" xmlns:com="http://schemas.openxmlformats.org/drawingml/2006/compatibility" xmlns:pvml="urn:schemas-microsoft-com:office:powerpoint" xmlns:v="urn:schemas-microsoft-com:vml" xmlns:o="urn:schemas-microsoft-com:office:office" xmlns:dgm="http://schemas.openxmlformats.org/drawingml/2006/diagram" xmlns:c="http://schemas.openxmlformats.org/drawingml/2006/chart" xmlns:mv="urn:schemas-microsoft-com:mac:vml" xmlns:mc="http://schemas.openxmlformats.org/markup-compatibility/2006" xmlns="" r:id="rId30" roundtripDataSignature="AMtx7mjFyVUGRZWio+dc9dxzYsimUxNJbg=="/>
     </p:ext>
   </p:extLst>
 </p:presentation>
@@ -13087,13 +13088,41 @@
             </a:endParaRPr>
           </a:p>
           <a:p>
-            <a:pPr marL="0" lvl="0" indent="0" algn="l" rtl="0">
-              <a:spcBef>
-                <a:spcPts val="0"/>
-              </a:spcBef>
-              <a:spcAft>
-                <a:spcPts val="0"/>
-              </a:spcAft>
+            <a:pPr marL="0" lvl="0" indent="0">
+              <a:buClr>
+                <a:srgbClr val="000000"/>
+              </a:buClr>
+              <a:buSzPts val="3200"/>
+              <a:buNone/>
+            </a:pPr>
+            <a:r>
+              <a:rPr lang="en-US" sz="4000" dirty="0">
+                <a:solidFill>
+                  <a:srgbClr val="000000"/>
+                </a:solidFill>
+              </a:rPr>
+              <a:t>How well does the paper address</a:t>
+            </a:r>
+          </a:p>
+          <a:p>
+            <a:pPr marL="0" lvl="0" indent="0">
+              <a:buClr>
+                <a:srgbClr val="000000"/>
+              </a:buClr>
+              <a:buSzPts val="3200"/>
+              <a:buNone/>
+            </a:pPr>
+            <a:r>
+              <a:rPr lang="en-US" sz="4000" dirty="0">
+                <a:solidFill>
+                  <a:srgbClr val="000000"/>
+                </a:solidFill>
+              </a:rPr>
+              <a:t>the goal you defined above?</a:t>
+            </a:r>
+          </a:p>
+          <a:p>
+            <a:pPr marL="0" lvl="0" indent="0">
               <a:buClr>
                 <a:srgbClr val="000000"/>
               </a:buClr>
@@ -13107,7 +13136,7 @@
             </a:endParaRPr>
           </a:p>
           <a:p>
-            <a:pPr marL="0" lvl="0" indent="0">
+            <a:pPr marL="0" indent="0">
               <a:buClr>
                 <a:srgbClr val="000000"/>
               </a:buClr>
@@ -13120,7 +13149,23 @@
                   <a:srgbClr val="000000"/>
                 </a:solidFill>
               </a:rPr>
-              <a:t>What actions can the public health officials take to achieve that goal?</a:t>
+              <a:t>			</a:t>
+            </a:r>
+            <a:r>
+              <a:rPr lang="en-US" sz="4000" dirty="0" err="1">
+                <a:solidFill>
+                  <a:srgbClr val="000000"/>
+                </a:solidFill>
+              </a:rPr>
+              <a:t>slido.com</a:t>
+            </a:r>
+            <a:r>
+              <a:rPr lang="en-US" sz="4000" dirty="0">
+                <a:solidFill>
+                  <a:srgbClr val="000000"/>
+                </a:solidFill>
+              </a:rPr>
+              <a:t>  #1341886</a:t>
             </a:r>
             <a:endParaRPr sz="4000" dirty="0">
               <a:solidFill>
@@ -13133,7 +13178,7 @@
     </p:spTree>
     <p:extLst>
       <p:ext uri="{BB962C8B-B14F-4D97-AF65-F5344CB8AC3E}">
-        <p14:creationId xmlns:p14="http://schemas.microsoft.com/office/powerpoint/2010/main" val="2564637539"/>
+        <p14:creationId xmlns:p14="http://schemas.microsoft.com/office/powerpoint/2010/main" val="4284856106"/>
       </p:ext>
     </p:extLst>
   </p:cSld>
@@ -13223,7 +13268,33 @@
           </a:bodyPr>
           <a:lstStyle/>
           <a:p>
-            <a:pPr marL="0" lvl="0" indent="0">
+            <a:pPr marL="0" lvl="0" indent="0" algn="l" rtl="0">
+              <a:spcBef>
+                <a:spcPts val="0"/>
+              </a:spcBef>
+              <a:spcAft>
+                <a:spcPts val="0"/>
+              </a:spcAft>
+              <a:buClr>
+                <a:srgbClr val="000000"/>
+              </a:buClr>
+              <a:buSzPts val="3200"/>
+              <a:buNone/>
+            </a:pPr>
+            <a:endParaRPr lang="en-US" sz="4000" dirty="0">
+              <a:solidFill>
+                <a:srgbClr val="000000"/>
+              </a:solidFill>
+            </a:endParaRPr>
+          </a:p>
+          <a:p>
+            <a:pPr marL="0" lvl="0" indent="0" algn="l" rtl="0">
+              <a:spcBef>
+                <a:spcPts val="0"/>
+              </a:spcBef>
+              <a:spcAft>
+                <a:spcPts val="0"/>
+              </a:spcAft>
               <a:buClr>
                 <a:srgbClr val="000000"/>
               </a:buClr>
@@ -13250,7 +13321,7 @@
                   <a:srgbClr val="000000"/>
                 </a:solidFill>
               </a:rPr>
-              <a:t>In what ways did the model change the actions or decisions that public health officials are taking in terms of when, where, and how to act?</a:t>
+              <a:t>What actions can the public health officials take to achieve that goal?</a:t>
             </a:r>
             <a:endParaRPr sz="4000" dirty="0">
               <a:solidFill>
@@ -13263,7 +13334,7 @@
     </p:spTree>
     <p:extLst>
       <p:ext uri="{BB962C8B-B14F-4D97-AF65-F5344CB8AC3E}">
-        <p14:creationId xmlns:p14="http://schemas.microsoft.com/office/powerpoint/2010/main" val="3255311184"/>
+        <p14:creationId xmlns:p14="http://schemas.microsoft.com/office/powerpoint/2010/main" val="2564637539"/>
       </p:ext>
     </p:extLst>
   </p:cSld>
@@ -13380,6 +13451,136 @@
                   <a:srgbClr val="000000"/>
                 </a:solidFill>
               </a:rPr>
+              <a:t>In what ways did the model change the actions or decisions that public health officials are taking in terms of when, where, and how to act?</a:t>
+            </a:r>
+            <a:endParaRPr sz="4000" dirty="0">
+              <a:solidFill>
+                <a:srgbClr val="000000"/>
+              </a:solidFill>
+            </a:endParaRPr>
+          </a:p>
+        </p:txBody>
+      </p:sp>
+    </p:spTree>
+    <p:extLst>
+      <p:ext uri="{BB962C8B-B14F-4D97-AF65-F5344CB8AC3E}">
+        <p14:creationId xmlns:p14="http://schemas.microsoft.com/office/powerpoint/2010/main" val="3255311184"/>
+      </p:ext>
+    </p:extLst>
+  </p:cSld>
+  <p:clrMapOvr>
+    <a:masterClrMapping/>
+  </p:clrMapOvr>
+</p:sld>
+</file>
+
+<file path=ppt/slides/slide15.xml><?xml version="1.0" encoding="utf-8"?>
+<p:sld xmlns:a="http://schemas.openxmlformats.org/drawingml/2006/main" xmlns:r="http://schemas.openxmlformats.org/officeDocument/2006/relationships" xmlns:p="http://schemas.openxmlformats.org/presentationml/2006/main">
+  <p:cSld>
+    <p:spTree>
+      <p:nvGrpSpPr>
+        <p:cNvPr id="1" name=""/>
+        <p:cNvGrpSpPr/>
+        <p:nvPr/>
+      </p:nvGrpSpPr>
+      <p:grpSpPr>
+        <a:xfrm>
+          <a:off x="0" y="0"/>
+          <a:ext cx="0" cy="0"/>
+          <a:chOff x="0" y="0"/>
+          <a:chExt cx="0" cy="0"/>
+        </a:xfrm>
+      </p:grpSpPr>
+      <p:sp>
+        <p:nvSpPr>
+          <p:cNvPr id="2" name="Title 1">
+            <a:extLst>
+              <a:ext uri="{FF2B5EF4-FFF2-40B4-BE49-F238E27FC236}">
+                <a16:creationId xmlns:a16="http://schemas.microsoft.com/office/drawing/2014/main" id="{8DE1804F-1831-E540-A1DC-073BA8437BAB}"/>
+              </a:ext>
+            </a:extLst>
+          </p:cNvPr>
+          <p:cNvSpPr>
+            <a:spLocks noGrp="1"/>
+          </p:cNvSpPr>
+          <p:nvPr>
+            <p:ph type="title"/>
+          </p:nvPr>
+        </p:nvSpPr>
+        <p:spPr/>
+        <p:txBody>
+          <a:bodyPr/>
+          <a:lstStyle/>
+          <a:p>
+            <a:r>
+              <a:rPr lang="en-US" dirty="0"/>
+              <a:t>Case Study</a:t>
+            </a:r>
+          </a:p>
+        </p:txBody>
+      </p:sp>
+      <p:sp>
+        <p:nvSpPr>
+          <p:cNvPr id="6" name="Google Shape;205;p17">
+            <a:extLst>
+              <a:ext uri="{FF2B5EF4-FFF2-40B4-BE49-F238E27FC236}">
+                <a16:creationId xmlns:a16="http://schemas.microsoft.com/office/drawing/2014/main" id="{662D86EB-0258-0B4A-BD6B-21DB54554E75}"/>
+              </a:ext>
+            </a:extLst>
+          </p:cNvPr>
+          <p:cNvSpPr txBox="1">
+            <a:spLocks noGrp="1"/>
+          </p:cNvSpPr>
+          <p:nvPr>
+            <p:ph type="body" idx="1"/>
+          </p:nvPr>
+        </p:nvSpPr>
+        <p:spPr>
+          <a:xfrm>
+            <a:off x="415600" y="1536633"/>
+            <a:ext cx="11360700" cy="4555200"/>
+          </a:xfrm>
+          <a:prstGeom prst="rect">
+            <a:avLst/>
+          </a:prstGeom>
+          <a:noFill/>
+          <a:ln>
+            <a:noFill/>
+          </a:ln>
+        </p:spPr>
+        <p:txBody>
+          <a:bodyPr spcFirstLastPara="1" wrap="square" lIns="91425" tIns="45700" rIns="91425" bIns="45700" anchor="t" anchorCtr="0">
+            <a:noAutofit/>
+          </a:bodyPr>
+          <a:lstStyle/>
+          <a:p>
+            <a:pPr marL="0" lvl="0" indent="0">
+              <a:buClr>
+                <a:srgbClr val="000000"/>
+              </a:buClr>
+              <a:buSzPts val="3200"/>
+              <a:buNone/>
+            </a:pPr>
+            <a:endParaRPr lang="en-US" sz="4000" dirty="0">
+              <a:solidFill>
+                <a:srgbClr val="000000"/>
+              </a:solidFill>
+            </a:endParaRPr>
+          </a:p>
+          <a:p>
+            <a:pPr marL="0" lvl="0" indent="0">
+              <a:buClr>
+                <a:srgbClr val="000000"/>
+              </a:buClr>
+              <a:buSzPts val="3200"/>
+              <a:buNone/>
+            </a:pPr>
+            <a:r>
+              <a:rPr lang="en-US" sz="4000" dirty="0">
+                <a:solidFill>
+                  <a:srgbClr val="000000"/>
+                </a:solidFill>
+              </a:rPr>
               <a:t>What ethical or fairness considerations might be relevant here? How were these addressed in the paper?</a:t>
             </a:r>
             <a:endParaRPr sz="4000" dirty="0">
@@ -13403,7 +13604,7 @@
 </p:sld>
 </file>
 
-<file path=ppt/slides/slide15.xml><?xml version="1.0" encoding="utf-8"?>
+<file path=ppt/slides/slide16.xml><?xml version="1.0" encoding="utf-8"?>
 <p:sld xmlns:a="http://schemas.openxmlformats.org/drawingml/2006/main" xmlns:r="http://schemas.openxmlformats.org/officeDocument/2006/relationships" xmlns:p="http://schemas.openxmlformats.org/presentationml/2006/main">
   <p:cSld>
     <p:spTree>
@@ -13504,7 +13705,7 @@
 </p:sld>
 </file>
 
-<file path=ppt/slides/slide16.xml><?xml version="1.0" encoding="utf-8"?>
+<file path=ppt/slides/slide17.xml><?xml version="1.0" encoding="utf-8"?>
 <p:sld xmlns:a="http://schemas.openxmlformats.org/drawingml/2006/main" xmlns:r="http://schemas.openxmlformats.org/officeDocument/2006/relationships" xmlns:p="http://schemas.openxmlformats.org/presentationml/2006/main">
   <p:cSld>
     <p:spTree>

</xml_diff>